<commit_message>
Lorenzo: generato PDF presentazione generale, aggiornata presentazione Treemaps e relativo PDF
</commit_message>
<xml_diff>
--- a/Teoria/PowerPoint/Treemaps.pptx
+++ b/Teoria/PowerPoint/Treemaps.pptx
@@ -273,7 +273,7 @@
           <a:p>
             <a:fld id="{A1720CB6-C394-4595-9B0B-B51B5CA3DAC2}" type="datetimeFigureOut">
               <a:rPr lang="it-IT" smtClean="0"/>
-              <a:t>17/05/2020</a:t>
+              <a:t>18/05/2020</a:t>
             </a:fld>
             <a:endParaRPr lang="it-IT"/>
           </a:p>
@@ -473,7 +473,7 @@
           <a:p>
             <a:fld id="{A1720CB6-C394-4595-9B0B-B51B5CA3DAC2}" type="datetimeFigureOut">
               <a:rPr lang="it-IT" smtClean="0"/>
-              <a:t>17/05/2020</a:t>
+              <a:t>18/05/2020</a:t>
             </a:fld>
             <a:endParaRPr lang="it-IT"/>
           </a:p>
@@ -683,7 +683,7 @@
           <a:p>
             <a:fld id="{A1720CB6-C394-4595-9B0B-B51B5CA3DAC2}" type="datetimeFigureOut">
               <a:rPr lang="it-IT" smtClean="0"/>
-              <a:t>17/05/2020</a:t>
+              <a:t>18/05/2020</a:t>
             </a:fld>
             <a:endParaRPr lang="it-IT"/>
           </a:p>
@@ -883,7 +883,7 @@
           <a:p>
             <a:fld id="{A1720CB6-C394-4595-9B0B-B51B5CA3DAC2}" type="datetimeFigureOut">
               <a:rPr lang="it-IT" smtClean="0"/>
-              <a:t>17/05/2020</a:t>
+              <a:t>18/05/2020</a:t>
             </a:fld>
             <a:endParaRPr lang="it-IT"/>
           </a:p>
@@ -1159,7 +1159,7 @@
           <a:p>
             <a:fld id="{A1720CB6-C394-4595-9B0B-B51B5CA3DAC2}" type="datetimeFigureOut">
               <a:rPr lang="it-IT" smtClean="0"/>
-              <a:t>17/05/2020</a:t>
+              <a:t>18/05/2020</a:t>
             </a:fld>
             <a:endParaRPr lang="it-IT"/>
           </a:p>
@@ -1427,7 +1427,7 @@
           <a:p>
             <a:fld id="{A1720CB6-C394-4595-9B0B-B51B5CA3DAC2}" type="datetimeFigureOut">
               <a:rPr lang="it-IT" smtClean="0"/>
-              <a:t>17/05/2020</a:t>
+              <a:t>18/05/2020</a:t>
             </a:fld>
             <a:endParaRPr lang="it-IT"/>
           </a:p>
@@ -1842,7 +1842,7 @@
           <a:p>
             <a:fld id="{A1720CB6-C394-4595-9B0B-B51B5CA3DAC2}" type="datetimeFigureOut">
               <a:rPr lang="it-IT" smtClean="0"/>
-              <a:t>17/05/2020</a:t>
+              <a:t>18/05/2020</a:t>
             </a:fld>
             <a:endParaRPr lang="it-IT"/>
           </a:p>
@@ -1984,7 +1984,7 @@
           <a:p>
             <a:fld id="{A1720CB6-C394-4595-9B0B-B51B5CA3DAC2}" type="datetimeFigureOut">
               <a:rPr lang="it-IT" smtClean="0"/>
-              <a:t>17/05/2020</a:t>
+              <a:t>18/05/2020</a:t>
             </a:fld>
             <a:endParaRPr lang="it-IT"/>
           </a:p>
@@ -2097,7 +2097,7 @@
           <a:p>
             <a:fld id="{A1720CB6-C394-4595-9B0B-B51B5CA3DAC2}" type="datetimeFigureOut">
               <a:rPr lang="it-IT" smtClean="0"/>
-              <a:t>17/05/2020</a:t>
+              <a:t>18/05/2020</a:t>
             </a:fld>
             <a:endParaRPr lang="it-IT"/>
           </a:p>
@@ -2410,7 +2410,7 @@
           <a:p>
             <a:fld id="{A1720CB6-C394-4595-9B0B-B51B5CA3DAC2}" type="datetimeFigureOut">
               <a:rPr lang="it-IT" smtClean="0"/>
-              <a:t>17/05/2020</a:t>
+              <a:t>18/05/2020</a:t>
             </a:fld>
             <a:endParaRPr lang="it-IT"/>
           </a:p>
@@ -2699,7 +2699,7 @@
           <a:p>
             <a:fld id="{A1720CB6-C394-4595-9B0B-B51B5CA3DAC2}" type="datetimeFigureOut">
               <a:rPr lang="it-IT" smtClean="0"/>
-              <a:t>17/05/2020</a:t>
+              <a:t>18/05/2020</a:t>
             </a:fld>
             <a:endParaRPr lang="it-IT"/>
           </a:p>
@@ -2942,7 +2942,7 @@
           <a:p>
             <a:fld id="{A1720CB6-C394-4595-9B0B-B51B5CA3DAC2}" type="datetimeFigureOut">
               <a:rPr lang="it-IT" smtClean="0"/>
-              <a:t>17/05/2020</a:t>
+              <a:t>18/05/2020</a:t>
             </a:fld>
             <a:endParaRPr lang="it-IT"/>
           </a:p>
@@ -3866,7 +3866,7 @@
           <a:p>
             <a:r>
               <a:rPr lang="it-IT" dirty="0"/>
-              <a:t>Contiene un punto del dataset comprensivo di tutti gli inquinanti, ma non della valutazione, poiché essa non è quantitativa</a:t>
+              <a:t>Permette di selezionare un mese del dataset comprensivo di tutti gli inquinanti (aggregati tramite media), ma non della valutazione, poiché essa non è quantitativa</a:t>
             </a:r>
           </a:p>
         </p:txBody>
@@ -3915,7 +3915,7 @@
           <a:p>
             <a:r>
               <a:rPr lang="it-IT" dirty="0"/>
-              <a:t>Scopo: Confrontare le proporzioni di inquinanti in un punto della gerarchia </a:t>
+              <a:t>Scopo: Confrontare le proporzioni di inquinanti in una porzione della gerarchia </a:t>
             </a:r>
           </a:p>
         </p:txBody>
@@ -4308,7 +4308,7 @@
         </p:blipFill>
         <p:spPr>
           <a:xfrm>
-            <a:off x="2933400" y="273794"/>
+            <a:off x="2933399" y="273794"/>
             <a:ext cx="6325190" cy="6310411"/>
           </a:xfrm>
           <a:prstGeom prst="rect">

</xml_diff>